<commit_message>
Lab Notes Feb. 29th, 2024
</commit_message>
<xml_diff>
--- a/Saturated Absorption Spectroscopy/Plechacek_Anthony/Misc Files/SAS 02_29_24, Anthony Plechacek.pptx
+++ b/Saturated Absorption Spectroscopy/Plechacek_Anthony/Misc Files/SAS 02_29_24, Anthony Plechacek.pptx
@@ -122,7 +122,7 @@
 <file path=ppt/revisionInfo.xml><?xml version="1.0" encoding="utf-8"?>
 <p1510:revInfo xmlns:a="http://schemas.openxmlformats.org/drawingml/2006/main" xmlns:r="http://schemas.openxmlformats.org/officeDocument/2006/relationships" xmlns:p1510="http://schemas.microsoft.com/office/powerpoint/2015/10/main">
   <p1510:revLst>
-    <p1510:client id="{E68924AD-EAE3-4594-9110-8983159BF39F}" v="164" dt="2024-02-29T13:43:48.194"/>
+    <p1510:client id="{E68924AD-EAE3-4594-9110-8983159BF39F}" v="167" dt="2024-02-29T13:54:24.065"/>
   </p1510:revLst>
 </p1510:revInfo>
 </file>
@@ -132,7 +132,7 @@
   <pc:docChgLst>
     <pc:chgData name="Plechacek, Anthony" userId="4375b502-3903-48d8-bf17-c7c69c231442" providerId="ADAL" clId="{E68924AD-EAE3-4594-9110-8983159BF39F}"/>
     <pc:docChg chg="undo custSel addSld delSld modSld sldOrd">
-      <pc:chgData name="Plechacek, Anthony" userId="4375b502-3903-48d8-bf17-c7c69c231442" providerId="ADAL" clId="{E68924AD-EAE3-4594-9110-8983159BF39F}" dt="2024-02-29T13:43:50.924" v="650" actId="1076"/>
+      <pc:chgData name="Plechacek, Anthony" userId="4375b502-3903-48d8-bf17-c7c69c231442" providerId="ADAL" clId="{E68924AD-EAE3-4594-9110-8983159BF39F}" dt="2024-02-29T13:54:24.064" v="654" actId="1076"/>
       <pc:docMkLst>
         <pc:docMk/>
       </pc:docMkLst>
@@ -441,7 +441,7 @@
         </pc:inkChg>
       </pc:sldChg>
       <pc:sldChg chg="addSp delSp modSp add mod">
-        <pc:chgData name="Plechacek, Anthony" userId="4375b502-3903-48d8-bf17-c7c69c231442" providerId="ADAL" clId="{E68924AD-EAE3-4594-9110-8983159BF39F}" dt="2024-02-29T13:42:01.826" v="634" actId="478"/>
+        <pc:chgData name="Plechacek, Anthony" userId="4375b502-3903-48d8-bf17-c7c69c231442" providerId="ADAL" clId="{E68924AD-EAE3-4594-9110-8983159BF39F}" dt="2024-02-29T13:54:24.064" v="654" actId="1076"/>
         <pc:sldMkLst>
           <pc:docMk/>
           <pc:sldMk cId="4211473047" sldId="265"/>
@@ -471,11 +471,19 @@
           </ac:spMkLst>
         </pc:spChg>
         <pc:picChg chg="add del mod">
-          <ac:chgData name="Plechacek, Anthony" userId="4375b502-3903-48d8-bf17-c7c69c231442" providerId="ADAL" clId="{E68924AD-EAE3-4594-9110-8983159BF39F}" dt="2024-02-29T13:42:01.826" v="634" actId="478"/>
+          <ac:chgData name="Plechacek, Anthony" userId="4375b502-3903-48d8-bf17-c7c69c231442" providerId="ADAL" clId="{E68924AD-EAE3-4594-9110-8983159BF39F}" dt="2024-02-29T13:54:16.548" v="651" actId="478"/>
           <ac:picMkLst>
             <pc:docMk/>
             <pc:sldMk cId="4211473047" sldId="265"/>
             <ac:picMk id="5" creationId="{AA5FF555-C34B-7F78-95BB-1C2E59BBB72E}"/>
+          </ac:picMkLst>
+        </pc:picChg>
+        <pc:picChg chg="add mod">
+          <ac:chgData name="Plechacek, Anthony" userId="4375b502-3903-48d8-bf17-c7c69c231442" providerId="ADAL" clId="{E68924AD-EAE3-4594-9110-8983159BF39F}" dt="2024-02-29T13:54:24.064" v="654" actId="1076"/>
+          <ac:picMkLst>
+            <pc:docMk/>
+            <pc:sldMk cId="4211473047" sldId="265"/>
+            <ac:picMk id="1026" creationId="{ABD4A168-2339-99AC-CB0C-BEDAAABC2FBE}"/>
           </ac:picMkLst>
         </pc:picChg>
       </pc:sldChg>
@@ -6710,36 +6718,6 @@
           </a:p>
         </p:txBody>
       </p:sp>
-      <p:pic>
-        <p:nvPicPr>
-          <p:cNvPr id="5" name="Picture 4">
-            <a:extLst>
-              <a:ext uri="{FF2B5EF4-FFF2-40B4-BE49-F238E27FC236}">
-                <a16:creationId xmlns:a16="http://schemas.microsoft.com/office/drawing/2014/main" id="{AA5FF555-C34B-7F78-95BB-1C2E59BBB72E}"/>
-              </a:ext>
-            </a:extLst>
-          </p:cNvPr>
-          <p:cNvPicPr>
-            <a:picLocks noChangeAspect="1"/>
-          </p:cNvPicPr>
-          <p:nvPr/>
-        </p:nvPicPr>
-        <p:blipFill>
-          <a:blip r:embed="rId2"/>
-          <a:stretch>
-            <a:fillRect/>
-          </a:stretch>
-        </p:blipFill>
-        <p:spPr>
-          <a:xfrm>
-            <a:off x="6503186" y="1843913"/>
-            <a:ext cx="5250687" cy="4784900"/>
-          </a:xfrm>
-          <a:prstGeom prst="rect">
-            <a:avLst/>
-          </a:prstGeom>
-        </p:spPr>
-      </p:pic>
       <p:sp>
         <p:nvSpPr>
           <p:cNvPr id="7" name="Content Placeholder 6">
@@ -6787,6 +6765,53 @@
           </a:p>
         </p:txBody>
       </p:sp>
+      <p:pic>
+        <p:nvPicPr>
+          <p:cNvPr id="1026" name="Picture 2" descr="Lecture 29">
+            <a:extLst>
+              <a:ext uri="{FF2B5EF4-FFF2-40B4-BE49-F238E27FC236}">
+                <a16:creationId xmlns:a16="http://schemas.microsoft.com/office/drawing/2014/main" id="{ABD4A168-2339-99AC-CB0C-BEDAAABC2FBE}"/>
+              </a:ext>
+            </a:extLst>
+          </p:cNvPr>
+          <p:cNvPicPr>
+            <a:picLocks noChangeAspect="1" noChangeArrowheads="1"/>
+          </p:cNvPicPr>
+          <p:nvPr/>
+        </p:nvPicPr>
+        <p:blipFill>
+          <a:blip r:embed="rId2">
+            <a:extLst>
+              <a:ext uri="{28A0092B-C50C-407E-A947-70E740481C1C}">
+                <a14:useLocalDpi xmlns:a14="http://schemas.microsoft.com/office/drawing/2010/main" val="0"/>
+              </a:ext>
+            </a:extLst>
+          </a:blip>
+          <a:srcRect/>
+          <a:stretch>
+            <a:fillRect/>
+          </a:stretch>
+        </p:blipFill>
+        <p:spPr bwMode="auto">
+          <a:xfrm>
+            <a:off x="6374048" y="2613615"/>
+            <a:ext cx="5472987" cy="3563348"/>
+          </a:xfrm>
+          <a:prstGeom prst="rect">
+            <a:avLst/>
+          </a:prstGeom>
+          <a:noFill/>
+          <a:extLst>
+            <a:ext uri="{909E8E84-426E-40DD-AFC4-6F175D3DCCD1}">
+              <a14:hiddenFill xmlns:a14="http://schemas.microsoft.com/office/drawing/2010/main">
+                <a:solidFill>
+                  <a:srgbClr val="FFFFFF"/>
+                </a:solidFill>
+              </a14:hiddenFill>
+            </a:ext>
+          </a:extLst>
+        </p:spPr>
+      </p:pic>
     </p:spTree>
     <p:extLst>
       <p:ext uri="{BB962C8B-B14F-4D97-AF65-F5344CB8AC3E}">
@@ -7558,8 +7583,8 @@
           </a:p>
         </p:txBody>
       </p:sp>
-      <mc:AlternateContent xmlns:mc="http://schemas.openxmlformats.org/markup-compatibility/2006">
-        <mc:Choice xmlns:a14="http://schemas.microsoft.com/office/drawing/2010/main" Requires="a14">
+      <mc:AlternateContent xmlns:mc="http://schemas.openxmlformats.org/markup-compatibility/2006" xmlns:a14="http://schemas.microsoft.com/office/drawing/2010/main">
+        <mc:Choice Requires="a14">
           <p:sp>
             <p:nvSpPr>
               <p:cNvPr id="3" name="Content Placeholder 2">
@@ -7839,7 +7864,7 @@
             </p:txBody>
           </p:sp>
         </mc:Choice>
-        <mc:Fallback>
+        <mc:Fallback xmlns="">
           <p:sp>
             <p:nvSpPr>
               <p:cNvPr id="3" name="Content Placeholder 2">
@@ -7933,8 +7958,8 @@
             </a:prstGeom>
           </p:spPr>
         </p:pic>
-        <mc:AlternateContent xmlns:mc="http://schemas.openxmlformats.org/markup-compatibility/2006">
-          <mc:Choice xmlns:p14="http://schemas.microsoft.com/office/powerpoint/2010/main" Requires="p14">
+        <mc:AlternateContent xmlns:mc="http://schemas.openxmlformats.org/markup-compatibility/2006" xmlns:p14="http://schemas.microsoft.com/office/powerpoint/2010/main">
+          <mc:Choice Requires="p14">
             <p:contentPart p14:bwMode="auto" r:id="rId4">
               <p14:nvContentPartPr>
                 <p14:cNvPr id="12" name="Ink 11">
@@ -7953,7 +7978,7 @@
               </p14:xfrm>
             </p:contentPart>
           </mc:Choice>
-          <mc:Fallback>
+          <mc:Fallback xmlns="">
             <p:pic>
               <p:nvPicPr>
                 <p:cNvPr id="12" name="Ink 11">
@@ -7984,8 +8009,8 @@
             </p:pic>
           </mc:Fallback>
         </mc:AlternateContent>
-        <mc:AlternateContent xmlns:mc="http://schemas.openxmlformats.org/markup-compatibility/2006">
-          <mc:Choice xmlns:p14="http://schemas.microsoft.com/office/powerpoint/2010/main" Requires="p14">
+        <mc:AlternateContent xmlns:mc="http://schemas.openxmlformats.org/markup-compatibility/2006" xmlns:p14="http://schemas.microsoft.com/office/powerpoint/2010/main">
+          <mc:Choice Requires="p14">
             <p:contentPart p14:bwMode="auto" r:id="rId6">
               <p14:nvContentPartPr>
                 <p14:cNvPr id="13" name="Ink 12">
@@ -8004,7 +8029,7 @@
               </p14:xfrm>
             </p:contentPart>
           </mc:Choice>
-          <mc:Fallback>
+          <mc:Fallback xmlns="">
             <p:pic>
               <p:nvPicPr>
                 <p:cNvPr id="13" name="Ink 12">
@@ -8035,8 +8060,8 @@
             </p:pic>
           </mc:Fallback>
         </mc:AlternateContent>
-        <mc:AlternateContent xmlns:mc="http://schemas.openxmlformats.org/markup-compatibility/2006">
-          <mc:Choice xmlns:p14="http://schemas.microsoft.com/office/powerpoint/2010/main" Requires="p14">
+        <mc:AlternateContent xmlns:mc="http://schemas.openxmlformats.org/markup-compatibility/2006" xmlns:p14="http://schemas.microsoft.com/office/powerpoint/2010/main">
+          <mc:Choice Requires="p14">
             <p:contentPart p14:bwMode="auto" r:id="rId8">
               <p14:nvContentPartPr>
                 <p14:cNvPr id="14" name="Ink 13">
@@ -8055,7 +8080,7 @@
               </p14:xfrm>
             </p:contentPart>
           </mc:Choice>
-          <mc:Fallback>
+          <mc:Fallback xmlns="">
             <p:pic>
               <p:nvPicPr>
                 <p:cNvPr id="14" name="Ink 13">
@@ -8086,8 +8111,8 @@
             </p:pic>
           </mc:Fallback>
         </mc:AlternateContent>
-        <mc:AlternateContent xmlns:mc="http://schemas.openxmlformats.org/markup-compatibility/2006">
-          <mc:Choice xmlns:p14="http://schemas.microsoft.com/office/powerpoint/2010/main" Requires="p14">
+        <mc:AlternateContent xmlns:mc="http://schemas.openxmlformats.org/markup-compatibility/2006" xmlns:p14="http://schemas.microsoft.com/office/powerpoint/2010/main">
+          <mc:Choice Requires="p14">
             <p:contentPart p14:bwMode="auto" r:id="rId10">
               <p14:nvContentPartPr>
                 <p14:cNvPr id="15" name="Ink 14">
@@ -8106,7 +8131,7 @@
               </p14:xfrm>
             </p:contentPart>
           </mc:Choice>
-          <mc:Fallback>
+          <mc:Fallback xmlns="">
             <p:pic>
               <p:nvPicPr>
                 <p:cNvPr id="15" name="Ink 14">
@@ -8157,8 +8182,8 @@
               <a:chExt cx="147600" cy="201240"/>
             </a:xfrm>
           </p:grpSpPr>
-          <mc:AlternateContent xmlns:mc="http://schemas.openxmlformats.org/markup-compatibility/2006">
-            <mc:Choice xmlns:p14="http://schemas.microsoft.com/office/powerpoint/2010/main" Requires="p14">
+          <mc:AlternateContent xmlns:mc="http://schemas.openxmlformats.org/markup-compatibility/2006" xmlns:p14="http://schemas.microsoft.com/office/powerpoint/2010/main">
+            <mc:Choice Requires="p14">
               <p:contentPart p14:bwMode="auto" r:id="rId12">
                 <p14:nvContentPartPr>
                   <p14:cNvPr id="21" name="Ink 20">
@@ -8177,7 +8202,7 @@
                 </p14:xfrm>
               </p:contentPart>
             </mc:Choice>
-            <mc:Fallback>
+            <mc:Fallback xmlns="">
               <p:pic>
                 <p:nvPicPr>
                   <p:cNvPr id="21" name="Ink 20">
@@ -8208,8 +8233,8 @@
               </p:pic>
             </mc:Fallback>
           </mc:AlternateContent>
-          <mc:AlternateContent xmlns:mc="http://schemas.openxmlformats.org/markup-compatibility/2006">
-            <mc:Choice xmlns:p14="http://schemas.microsoft.com/office/powerpoint/2010/main" Requires="p14">
+          <mc:AlternateContent xmlns:mc="http://schemas.openxmlformats.org/markup-compatibility/2006" xmlns:p14="http://schemas.microsoft.com/office/powerpoint/2010/main">
+            <mc:Choice Requires="p14">
               <p:contentPart p14:bwMode="auto" r:id="rId14">
                 <p14:nvContentPartPr>
                   <p14:cNvPr id="22" name="Ink 21">
@@ -8228,7 +8253,7 @@
                 </p14:xfrm>
               </p:contentPart>
             </mc:Choice>
-            <mc:Fallback>
+            <mc:Fallback xmlns="">
               <p:pic>
                 <p:nvPicPr>
                   <p:cNvPr id="22" name="Ink 21">
@@ -9062,8 +9087,8 @@
           </a:prstGeom>
         </p:spPr>
       </p:pic>
-      <mc:AlternateContent xmlns:mc="http://schemas.openxmlformats.org/markup-compatibility/2006">
-        <mc:Choice xmlns:p14="http://schemas.microsoft.com/office/powerpoint/2010/main" Requires="p14">
+      <mc:AlternateContent xmlns:mc="http://schemas.openxmlformats.org/markup-compatibility/2006" xmlns:p14="http://schemas.microsoft.com/office/powerpoint/2010/main">
+        <mc:Choice Requires="p14">
           <p:contentPart p14:bwMode="auto" r:id="rId3">
             <p14:nvContentPartPr>
               <p14:cNvPr id="4" name="Ink 3">
@@ -9082,7 +9107,7 @@
             </p14:xfrm>
           </p:contentPart>
         </mc:Choice>
-        <mc:Fallback>
+        <mc:Fallback xmlns="">
           <p:pic>
             <p:nvPicPr>
               <p:cNvPr id="4" name="Ink 3">
@@ -9113,8 +9138,8 @@
           </p:pic>
         </mc:Fallback>
       </mc:AlternateContent>
-      <mc:AlternateContent xmlns:mc="http://schemas.openxmlformats.org/markup-compatibility/2006">
-        <mc:Choice xmlns:p14="http://schemas.microsoft.com/office/powerpoint/2010/main" Requires="p14">
+      <mc:AlternateContent xmlns:mc="http://schemas.openxmlformats.org/markup-compatibility/2006" xmlns:p14="http://schemas.microsoft.com/office/powerpoint/2010/main">
+        <mc:Choice Requires="p14">
           <p:contentPart p14:bwMode="auto" r:id="rId5">
             <p14:nvContentPartPr>
               <p14:cNvPr id="9" name="Ink 8">
@@ -9133,7 +9158,7 @@
             </p14:xfrm>
           </p:contentPart>
         </mc:Choice>
-        <mc:Fallback>
+        <mc:Fallback xmlns="">
           <p:pic>
             <p:nvPicPr>
               <p:cNvPr id="9" name="Ink 8">
@@ -9164,8 +9189,8 @@
           </p:pic>
         </mc:Fallback>
       </mc:AlternateContent>
-      <mc:AlternateContent xmlns:mc="http://schemas.openxmlformats.org/markup-compatibility/2006">
-        <mc:Choice xmlns:p14="http://schemas.microsoft.com/office/powerpoint/2010/main" Requires="p14">
+      <mc:AlternateContent xmlns:mc="http://schemas.openxmlformats.org/markup-compatibility/2006" xmlns:p14="http://schemas.microsoft.com/office/powerpoint/2010/main">
+        <mc:Choice Requires="p14">
           <p:contentPart p14:bwMode="auto" r:id="rId7">
             <p14:nvContentPartPr>
               <p14:cNvPr id="12" name="Ink 11">
@@ -9184,7 +9209,7 @@
             </p14:xfrm>
           </p:contentPart>
         </mc:Choice>
-        <mc:Fallback>
+        <mc:Fallback xmlns="">
           <p:pic>
             <p:nvPicPr>
               <p:cNvPr id="12" name="Ink 11">
@@ -10796,26 +10821,6 @@
 </file>
 
 <file path=customXml/item1.xml><?xml version="1.0" encoding="utf-8"?>
-<p:properties xmlns:p="http://schemas.microsoft.com/office/2006/metadata/properties" xmlns:xsi="http://www.w3.org/2001/XMLSchema-instance" xmlns:pc="http://schemas.microsoft.com/office/infopath/2007/PartnerControls">
-  <documentManagement>
-    <lcf76f155ced4ddcb4097134ff3c332f xmlns="ae5784c4-7238-4a51-b338-ece355f554e1">
-      <Terms xmlns="http://schemas.microsoft.com/office/infopath/2007/PartnerControls"/>
-    </lcf76f155ced4ddcb4097134ff3c332f>
-    <TaxCatchAll xmlns="11f46ab9-3877-4656-9c26-b0dc42ee7602" xsi:nil="true"/>
-  </documentManagement>
-</p:properties>
-</file>
-
-<file path=customXml/item2.xml><?xml version="1.0" encoding="utf-8"?>
-<?mso-contentType ?>
-<FormTemplates xmlns="http://schemas.microsoft.com/sharepoint/v3/contenttype/forms">
-  <Display>DocumentLibraryForm</Display>
-  <Edit>DocumentLibraryForm</Edit>
-  <New>DocumentLibraryForm</New>
-</FormTemplates>
-</file>
-
-<file path=customXml/item3.xml><?xml version="1.0" encoding="utf-8"?>
 <ct:contentTypeSchema xmlns:ct="http://schemas.microsoft.com/office/2006/metadata/contentType" xmlns:ma="http://schemas.microsoft.com/office/2006/metadata/properties/metaAttributes" ct:_="" ma:_="" ma:contentTypeName="Document" ma:contentTypeID="0x010100C3319FAAC1FE484DBEC8511CF944106E" ma:contentTypeVersion="10" ma:contentTypeDescription="Create a new document." ma:contentTypeScope="" ma:versionID="b13eb59554104dbd1164deb615a13a99">
   <xsd:schema xmlns:xsd="http://www.w3.org/2001/XMLSchema" xmlns:xs="http://www.w3.org/2001/XMLSchema" xmlns:p="http://schemas.microsoft.com/office/2006/metadata/properties" xmlns:ns2="ae5784c4-7238-4a51-b338-ece355f554e1" xmlns:ns3="11f46ab9-3877-4656-9c26-b0dc42ee7602" targetNamespace="http://schemas.microsoft.com/office/2006/metadata/properties" ma:root="true" ma:fieldsID="f14b276f3cfa7227d09e49bf56b50d48" ns2:_="" ns3:_="">
     <xsd:import namespace="ae5784c4-7238-4a51-b338-ece355f554e1"/>
@@ -11004,26 +11009,27 @@
 </ct:contentTypeSchema>
 </file>
 
-<file path=customXml/itemProps1.xml><?xml version="1.0" encoding="utf-8"?>
-<ds:datastoreItem xmlns:ds="http://schemas.openxmlformats.org/officeDocument/2006/customXml" ds:itemID="{E370D3D9-A750-40D5-8AB3-F5D7846DE96E}">
-  <ds:schemaRefs>
-    <ds:schemaRef ds:uri="http://schemas.microsoft.com/office/2006/metadata/properties"/>
-    <ds:schemaRef ds:uri="http://schemas.microsoft.com/office/infopath/2007/PartnerControls"/>
-    <ds:schemaRef ds:uri="ae5784c4-7238-4a51-b338-ece355f554e1"/>
-    <ds:schemaRef ds:uri="11f46ab9-3877-4656-9c26-b0dc42ee7602"/>
-  </ds:schemaRefs>
-</ds:datastoreItem>
+<file path=customXml/item2.xml><?xml version="1.0" encoding="utf-8"?>
+<?mso-contentType ?>
+<FormTemplates xmlns="http://schemas.microsoft.com/sharepoint/v3/contenttype/forms">
+  <Display>DocumentLibraryForm</Display>
+  <Edit>DocumentLibraryForm</Edit>
+  <New>DocumentLibraryForm</New>
+</FormTemplates>
 </file>
 
-<file path=customXml/itemProps2.xml><?xml version="1.0" encoding="utf-8"?>
-<ds:datastoreItem xmlns:ds="http://schemas.openxmlformats.org/officeDocument/2006/customXml" ds:itemID="{82AD23C1-82AA-421E-9A3E-94E18C9CD185}">
-  <ds:schemaRefs>
-    <ds:schemaRef ds:uri="http://schemas.microsoft.com/sharepoint/v3/contenttype/forms"/>
-  </ds:schemaRefs>
-</ds:datastoreItem>
+<file path=customXml/item3.xml><?xml version="1.0" encoding="utf-8"?>
+<p:properties xmlns:p="http://schemas.microsoft.com/office/2006/metadata/properties" xmlns:xsi="http://www.w3.org/2001/XMLSchema-instance" xmlns:pc="http://schemas.microsoft.com/office/infopath/2007/PartnerControls">
+  <documentManagement>
+    <lcf76f155ced4ddcb4097134ff3c332f xmlns="ae5784c4-7238-4a51-b338-ece355f554e1">
+      <Terms xmlns="http://schemas.microsoft.com/office/infopath/2007/PartnerControls"/>
+    </lcf76f155ced4ddcb4097134ff3c332f>
+    <TaxCatchAll xmlns="11f46ab9-3877-4656-9c26-b0dc42ee7602" xsi:nil="true"/>
+  </documentManagement>
+</p:properties>
 </file>
 
-<file path=customXml/itemProps3.xml><?xml version="1.0" encoding="utf-8"?>
+<file path=customXml/itemProps1.xml><?xml version="1.0" encoding="utf-8"?>
 <ds:datastoreItem xmlns:ds="http://schemas.openxmlformats.org/officeDocument/2006/customXml" ds:itemID="{68B95633-0228-4D5E-B496-3B51B08AE0E4}">
   <ds:schemaRefs>
     <ds:schemaRef ds:uri="http://schemas.microsoft.com/office/2006/metadata/contentType"/>
@@ -11040,4 +11046,29 @@
     <ds:schemaRef ds:uri="http://schemas.microsoft.com/internal/obd"/>
   </ds:schemaRefs>
 </ds:datastoreItem>
+</file>
+
+<file path=customXml/itemProps2.xml><?xml version="1.0" encoding="utf-8"?>
+<ds:datastoreItem xmlns:ds="http://schemas.openxmlformats.org/officeDocument/2006/customXml" ds:itemID="{82AD23C1-82AA-421E-9A3E-94E18C9CD185}">
+  <ds:schemaRefs>
+    <ds:schemaRef ds:uri="http://schemas.microsoft.com/sharepoint/v3/contenttype/forms"/>
+  </ds:schemaRefs>
+</ds:datastoreItem>
+</file>
+
+<file path=customXml/itemProps3.xml><?xml version="1.0" encoding="utf-8"?>
+<ds:datastoreItem xmlns:ds="http://schemas.openxmlformats.org/officeDocument/2006/customXml" ds:itemID="{E370D3D9-A750-40D5-8AB3-F5D7846DE96E}">
+  <ds:schemaRefs>
+    <ds:schemaRef ds:uri="http://purl.org/dc/terms/"/>
+    <ds:schemaRef ds:uri="ae5784c4-7238-4a51-b338-ece355f554e1"/>
+    <ds:schemaRef ds:uri="http://purl.org/dc/elements/1.1/"/>
+    <ds:schemaRef ds:uri="http://schemas.microsoft.com/office/2006/documentManagement/types"/>
+    <ds:schemaRef ds:uri="http://schemas.microsoft.com/office/infopath/2007/PartnerControls"/>
+    <ds:schemaRef ds:uri="11f46ab9-3877-4656-9c26-b0dc42ee7602"/>
+    <ds:schemaRef ds:uri="http://purl.org/dc/dcmitype/"/>
+    <ds:schemaRef ds:uri="http://schemas.openxmlformats.org/package/2006/metadata/core-properties"/>
+    <ds:schemaRef ds:uri="http://schemas.microsoft.com/office/2006/metadata/properties"/>
+    <ds:schemaRef ds:uri="http://www.w3.org/XML/1998/namespace"/>
+  </ds:schemaRefs>
+</ds:datastoreItem>
 </file>
</xml_diff>